<commit_message>
Updating Final Project Presentation Report
</commit_message>
<xml_diff>
--- a/Global Banking Fraud Detection & Risk Analysis Presentation.pptx
+++ b/Global Banking Fraud Detection & Risk Analysis Presentation.pptx
@@ -10,6 +10,8 @@
     <p:sldId id="258" r:id="rId4"/>
     <p:sldId id="259" r:id="rId5"/>
     <p:sldId id="260" r:id="rId6"/>
+    <p:sldId id="261" r:id="rId7"/>
+    <p:sldId id="262" r:id="rId8"/>
   </p:sldIdLst>
   <p:sldSz cx="12192000" cy="6858000"/>
   <p:notesSz cx="6858000" cy="9144000"/>
@@ -108,6 +110,11 @@
       </a:defRPr>
     </a:lvl9pPr>
   </p:defaultTextStyle>
+  <p:extLst>
+    <p:ext uri="{EFAFB233-063F-42B5-8137-9DF3F51BA10A}">
+      <p15:sldGuideLst xmlns:p15="http://schemas.microsoft.com/office/powerpoint/2012/main"/>
+    </p:ext>
+  </p:extLst>
 </p:presentation>
 </file>
 
@@ -8566,6 +8573,216 @@
 </p:sld>
 </file>
 
+<file path=ppt/slides/slide6.xml><?xml version="1.0" encoding="utf-8"?>
+<p:sld xmlns:a="http://schemas.openxmlformats.org/drawingml/2006/main" xmlns:r="http://schemas.openxmlformats.org/officeDocument/2006/relationships" xmlns:p="http://schemas.openxmlformats.org/presentationml/2006/main">
+  <p:cSld>
+    <p:spTree>
+      <p:nvGrpSpPr>
+        <p:cNvPr id="1" name=""/>
+        <p:cNvGrpSpPr/>
+        <p:nvPr/>
+      </p:nvGrpSpPr>
+      <p:grpSpPr>
+        <a:xfrm>
+          <a:off x="0" y="0"/>
+          <a:ext cx="0" cy="0"/>
+          <a:chOff x="0" y="0"/>
+          <a:chExt cx="0" cy="0"/>
+        </a:xfrm>
+      </p:grpSpPr>
+      <p:sp>
+        <p:nvSpPr>
+          <p:cNvPr id="2" name="Title 1">
+            <a:extLst>
+              <a:ext uri="{FF2B5EF4-FFF2-40B4-BE49-F238E27FC236}">
+                <a16:creationId xmlns:a16="http://schemas.microsoft.com/office/drawing/2014/main" id="{959D80F9-273F-665B-0550-9A3B520A7BE7}"/>
+              </a:ext>
+            </a:extLst>
+          </p:cNvPr>
+          <p:cNvSpPr>
+            <a:spLocks noGrp="1"/>
+          </p:cNvSpPr>
+          <p:nvPr>
+            <p:ph type="title"/>
+          </p:nvPr>
+        </p:nvSpPr>
+        <p:spPr/>
+        <p:txBody>
+          <a:bodyPr/>
+          <a:lstStyle/>
+          <a:p>
+            <a:r>
+              <a:rPr lang="en-US" dirty="0"/>
+              <a:t>Methodology (end-to-end Pipeline)</a:t>
+            </a:r>
+          </a:p>
+        </p:txBody>
+      </p:sp>
+      <p:sp>
+        <p:nvSpPr>
+          <p:cNvPr id="3" name="Content Placeholder 2">
+            <a:extLst>
+              <a:ext uri="{FF2B5EF4-FFF2-40B4-BE49-F238E27FC236}">
+                <a16:creationId xmlns:a16="http://schemas.microsoft.com/office/drawing/2014/main" id="{16515A67-74BD-9E19-7813-B2789C4F84D5}"/>
+              </a:ext>
+            </a:extLst>
+          </p:cNvPr>
+          <p:cNvSpPr>
+            <a:spLocks noGrp="1"/>
+          </p:cNvSpPr>
+          <p:nvPr>
+            <p:ph idx="1"/>
+          </p:nvPr>
+        </p:nvSpPr>
+        <p:spPr>
+          <a:xfrm>
+            <a:off x="2589212" y="1905000"/>
+            <a:ext cx="8915400" cy="3777622"/>
+          </a:xfrm>
+        </p:spPr>
+        <p:txBody>
+          <a:bodyPr/>
+          <a:lstStyle/>
+          <a:p>
+            <a:pPr marL="0" indent="0">
+              <a:buNone/>
+            </a:pPr>
+            <a:r>
+              <a:rPr lang="en-US" dirty="0"/>
+              <a:t>To Ensure scalability and realism, the project follows a structured analytics pipeline like real banking environments.</a:t>
+            </a:r>
+          </a:p>
+          <a:p>
+            <a:pPr marL="0" indent="0">
+              <a:buNone/>
+            </a:pPr>
+            <a:r>
+              <a:rPr lang="en-US" b="1" dirty="0"/>
+              <a:t>Workflow:</a:t>
+            </a:r>
+          </a:p>
+          <a:p>
+            <a:r>
+              <a:rPr lang="en-US" sz="1600" dirty="0"/>
+              <a:t>Excel: Data cleaning, formatting, and preparation</a:t>
+            </a:r>
+          </a:p>
+          <a:p>
+            <a:r>
+              <a:rPr lang="en-US" sz="1600" dirty="0"/>
+              <a:t>SQL: Queries, Aggregations, fraud analysis, and KPI calculations</a:t>
+            </a:r>
+          </a:p>
+          <a:p>
+            <a:r>
+              <a:rPr lang="en-US" sz="1600" dirty="0"/>
+              <a:t>Power BI: Interactive dashboards and storytelling visuals</a:t>
+            </a:r>
+          </a:p>
+          <a:p>
+            <a:pPr marL="0" indent="0">
+              <a:buNone/>
+            </a:pPr>
+            <a:r>
+              <a:rPr lang="en-US" sz="1600" dirty="0"/>
+              <a:t>This Layered approach ensures accuracy, performance, and clarity.</a:t>
+            </a:r>
+          </a:p>
+        </p:txBody>
+      </p:sp>
+    </p:spTree>
+    <p:extLst>
+      <p:ext uri="{BB962C8B-B14F-4D97-AF65-F5344CB8AC3E}">
+        <p14:creationId xmlns:p14="http://schemas.microsoft.com/office/powerpoint/2010/main" val="161166094"/>
+      </p:ext>
+    </p:extLst>
+  </p:cSld>
+  <p:clrMapOvr>
+    <a:masterClrMapping/>
+  </p:clrMapOvr>
+</p:sld>
+</file>
+
+<file path=ppt/slides/slide7.xml><?xml version="1.0" encoding="utf-8"?>
+<p:sld xmlns:a="http://schemas.openxmlformats.org/drawingml/2006/main" xmlns:r="http://schemas.openxmlformats.org/officeDocument/2006/relationships" xmlns:p="http://schemas.openxmlformats.org/presentationml/2006/main">
+  <p:cSld>
+    <p:spTree>
+      <p:nvGrpSpPr>
+        <p:cNvPr id="1" name=""/>
+        <p:cNvGrpSpPr/>
+        <p:nvPr/>
+      </p:nvGrpSpPr>
+      <p:grpSpPr>
+        <a:xfrm>
+          <a:off x="0" y="0"/>
+          <a:ext cx="0" cy="0"/>
+          <a:chOff x="0" y="0"/>
+          <a:chExt cx="0" cy="0"/>
+        </a:xfrm>
+      </p:grpSpPr>
+      <p:sp>
+        <p:nvSpPr>
+          <p:cNvPr id="2" name="Title 1">
+            <a:extLst>
+              <a:ext uri="{FF2B5EF4-FFF2-40B4-BE49-F238E27FC236}">
+                <a16:creationId xmlns:a16="http://schemas.microsoft.com/office/drawing/2014/main" id="{DB3A7AB7-6372-D093-75DC-626530ABBBB0}"/>
+              </a:ext>
+            </a:extLst>
+          </p:cNvPr>
+          <p:cNvSpPr>
+            <a:spLocks noGrp="1"/>
+          </p:cNvSpPr>
+          <p:nvPr>
+            <p:ph type="title"/>
+          </p:nvPr>
+        </p:nvSpPr>
+        <p:spPr/>
+        <p:txBody>
+          <a:bodyPr/>
+          <a:lstStyle/>
+          <a:p>
+            <a:endParaRPr lang="en-US"/>
+          </a:p>
+        </p:txBody>
+      </p:sp>
+      <p:sp>
+        <p:nvSpPr>
+          <p:cNvPr id="3" name="Content Placeholder 2">
+            <a:extLst>
+              <a:ext uri="{FF2B5EF4-FFF2-40B4-BE49-F238E27FC236}">
+                <a16:creationId xmlns:a16="http://schemas.microsoft.com/office/drawing/2014/main" id="{EF66727E-7C71-1948-AFAB-EF577B431A06}"/>
+              </a:ext>
+            </a:extLst>
+          </p:cNvPr>
+          <p:cNvSpPr>
+            <a:spLocks noGrp="1"/>
+          </p:cNvSpPr>
+          <p:nvPr>
+            <p:ph idx="1"/>
+          </p:nvPr>
+        </p:nvSpPr>
+        <p:spPr/>
+        <p:txBody>
+          <a:bodyPr/>
+          <a:lstStyle/>
+          <a:p>
+            <a:endParaRPr lang="en-US"/>
+          </a:p>
+        </p:txBody>
+      </p:sp>
+    </p:spTree>
+    <p:extLst>
+      <p:ext uri="{BB962C8B-B14F-4D97-AF65-F5344CB8AC3E}">
+        <p14:creationId xmlns:p14="http://schemas.microsoft.com/office/powerpoint/2010/main" val="2362849659"/>
+      </p:ext>
+    </p:extLst>
+  </p:cSld>
+  <p:clrMapOvr>
+    <a:masterClrMapping/>
+  </p:clrMapOvr>
+</p:sld>
+</file>
+
 <file path=ppt/theme/theme1.xml><?xml version="1.0" encoding="utf-8"?>
 <a:theme xmlns:a="http://schemas.openxmlformats.org/drawingml/2006/main" name="Wisp">
   <a:themeElements>

</xml_diff>

<commit_message>
Updating Final Project Presentation Report and SQL Script File
</commit_message>
<xml_diff>
--- a/Global Banking Fraud Detection & Risk Analysis Presentation.pptx
+++ b/Global Banking Fraud Detection & Risk Analysis Presentation.pptx
@@ -12,6 +12,8 @@
     <p:sldId id="260" r:id="rId6"/>
     <p:sldId id="261" r:id="rId7"/>
     <p:sldId id="262" r:id="rId8"/>
+    <p:sldId id="263" r:id="rId9"/>
+    <p:sldId id="264" r:id="rId10"/>
   </p:sldIdLst>
   <p:sldSz cx="12192000" cy="6858000"/>
   <p:notesSz cx="6858000" cy="9144000"/>
@@ -116,6 +118,136 @@
     </p:ext>
   </p:extLst>
 </p:presentation>
+</file>
+
+<file path=ppt/revisionInfo.xml><?xml version="1.0" encoding="utf-8"?>
+<p1510:revInfo xmlns:a="http://schemas.openxmlformats.org/drawingml/2006/main" xmlns:r="http://schemas.openxmlformats.org/officeDocument/2006/relationships" xmlns:p1510="http://schemas.microsoft.com/office/powerpoint/2015/10/main">
+  <p1510:revLst>
+    <p1510:client id="{A7DD1D84-42FB-8245-BC58-A583FDB82811}" v="14" dt="2025-12-19T22:22:17.758"/>
+  </p1510:revLst>
+</p1510:revInfo>
+</file>
+
+<file path=ppt/changesInfos/changesInfo1.xml><?xml version="1.0" encoding="utf-8"?>
+<pc:chgInfo xmlns:a="http://schemas.openxmlformats.org/drawingml/2006/main" xmlns:r="http://schemas.openxmlformats.org/officeDocument/2006/relationships" xmlns:ac="http://schemas.microsoft.com/office/drawing/2013/main/command" xmlns:pc="http://schemas.microsoft.com/office/powerpoint/2013/main/command">
+  <pc:docChgLst>
+    <pc:chgData name="Garv ." userId="517ebc9b-5a76-4003-9b3c-a98d08664bbd" providerId="ADAL" clId="{F659861F-A15D-5394-9866-47331A7A7B4B}"/>
+    <pc:docChg chg="undo redo custSel addSld modSld">
+      <pc:chgData name="Garv ." userId="517ebc9b-5a76-4003-9b3c-a98d08664bbd" providerId="ADAL" clId="{F659861F-A15D-5394-9866-47331A7A7B4B}" dt="2025-12-19T22:23:16.878" v="1688" actId="20577"/>
+      <pc:docMkLst>
+        <pc:docMk/>
+      </pc:docMkLst>
+      <pc:sldChg chg="modSp mod">
+        <pc:chgData name="Garv ." userId="517ebc9b-5a76-4003-9b3c-a98d08664bbd" providerId="ADAL" clId="{F659861F-A15D-5394-9866-47331A7A7B4B}" dt="2025-12-19T21:01:55.431" v="521" actId="20577"/>
+        <pc:sldMkLst>
+          <pc:docMk/>
+          <pc:sldMk cId="161166094" sldId="261"/>
+        </pc:sldMkLst>
+        <pc:spChg chg="mod">
+          <ac:chgData name="Garv ." userId="517ebc9b-5a76-4003-9b3c-a98d08664bbd" providerId="ADAL" clId="{F659861F-A15D-5394-9866-47331A7A7B4B}" dt="2025-12-19T21:01:55.431" v="521" actId="20577"/>
+          <ac:spMkLst>
+            <pc:docMk/>
+            <pc:sldMk cId="161166094" sldId="261"/>
+            <ac:spMk id="3" creationId="{16515A67-74BD-9E19-7813-B2789C4F84D5}"/>
+          </ac:spMkLst>
+        </pc:spChg>
+      </pc:sldChg>
+      <pc:sldChg chg="modSp mod">
+        <pc:chgData name="Garv ." userId="517ebc9b-5a76-4003-9b3c-a98d08664bbd" providerId="ADAL" clId="{F659861F-A15D-5394-9866-47331A7A7B4B}" dt="2025-12-19T21:02:09.785" v="541" actId="313"/>
+        <pc:sldMkLst>
+          <pc:docMk/>
+          <pc:sldMk cId="2362849659" sldId="262"/>
+        </pc:sldMkLst>
+        <pc:spChg chg="mod">
+          <ac:chgData name="Garv ." userId="517ebc9b-5a76-4003-9b3c-a98d08664bbd" providerId="ADAL" clId="{F659861F-A15D-5394-9866-47331A7A7B4B}" dt="2025-12-19T20:54:06.277" v="36" actId="313"/>
+          <ac:spMkLst>
+            <pc:docMk/>
+            <pc:sldMk cId="2362849659" sldId="262"/>
+            <ac:spMk id="2" creationId="{DB3A7AB7-6372-D093-75DC-626530ABBBB0}"/>
+          </ac:spMkLst>
+        </pc:spChg>
+        <pc:spChg chg="mod">
+          <ac:chgData name="Garv ." userId="517ebc9b-5a76-4003-9b3c-a98d08664bbd" providerId="ADAL" clId="{F659861F-A15D-5394-9866-47331A7A7B4B}" dt="2025-12-19T21:02:09.785" v="541" actId="313"/>
+          <ac:spMkLst>
+            <pc:docMk/>
+            <pc:sldMk cId="2362849659" sldId="262"/>
+            <ac:spMk id="3" creationId="{EF66727E-7C71-1948-AFAB-EF577B431A06}"/>
+          </ac:spMkLst>
+        </pc:spChg>
+      </pc:sldChg>
+      <pc:sldChg chg="addSp modSp new mod">
+        <pc:chgData name="Garv ." userId="517ebc9b-5a76-4003-9b3c-a98d08664bbd" providerId="ADAL" clId="{F659861F-A15D-5394-9866-47331A7A7B4B}" dt="2025-12-19T22:23:16.878" v="1688" actId="20577"/>
+        <pc:sldMkLst>
+          <pc:docMk/>
+          <pc:sldMk cId="1674953985" sldId="263"/>
+        </pc:sldMkLst>
+        <pc:spChg chg="mod">
+          <ac:chgData name="Garv ." userId="517ebc9b-5a76-4003-9b3c-a98d08664bbd" providerId="ADAL" clId="{F659861F-A15D-5394-9866-47331A7A7B4B}" dt="2025-12-19T21:44:06.463" v="561" actId="20577"/>
+          <ac:spMkLst>
+            <pc:docMk/>
+            <pc:sldMk cId="1674953985" sldId="263"/>
+            <ac:spMk id="2" creationId="{5FFDC9E4-426C-E933-DC3E-7B1A4101A069}"/>
+          </ac:spMkLst>
+        </pc:spChg>
+        <pc:spChg chg="mod">
+          <ac:chgData name="Garv ." userId="517ebc9b-5a76-4003-9b3c-a98d08664bbd" providerId="ADAL" clId="{F659861F-A15D-5394-9866-47331A7A7B4B}" dt="2025-12-19T22:23:16.878" v="1688" actId="20577"/>
+          <ac:spMkLst>
+            <pc:docMk/>
+            <pc:sldMk cId="1674953985" sldId="263"/>
+            <ac:spMk id="3" creationId="{DC8C6A0F-AD84-A6BA-D0FC-41428439EEF3}"/>
+          </ac:spMkLst>
+        </pc:spChg>
+        <pc:spChg chg="add">
+          <ac:chgData name="Garv ." userId="517ebc9b-5a76-4003-9b3c-a98d08664bbd" providerId="ADAL" clId="{F659861F-A15D-5394-9866-47331A7A7B4B}" dt="2025-12-19T22:18:59.189" v="1073"/>
+          <ac:spMkLst>
+            <pc:docMk/>
+            <pc:sldMk cId="1674953985" sldId="263"/>
+            <ac:spMk id="4" creationId="{1E2767CC-7FFE-D84C-C577-686191F0CD2A}"/>
+          </ac:spMkLst>
+        </pc:spChg>
+      </pc:sldChg>
+      <pc:sldChg chg="addSp delSp modSp new mod">
+        <pc:chgData name="Garv ." userId="517ebc9b-5a76-4003-9b3c-a98d08664bbd" providerId="ADAL" clId="{F659861F-A15D-5394-9866-47331A7A7B4B}" dt="2025-12-19T22:04:43.873" v="1072" actId="20577"/>
+        <pc:sldMkLst>
+          <pc:docMk/>
+          <pc:sldMk cId="2080373582" sldId="264"/>
+        </pc:sldMkLst>
+        <pc:spChg chg="mod">
+          <ac:chgData name="Garv ." userId="517ebc9b-5a76-4003-9b3c-a98d08664bbd" providerId="ADAL" clId="{F659861F-A15D-5394-9866-47331A7A7B4B}" dt="2025-12-19T22:04:32.044" v="1046" actId="313"/>
+          <ac:spMkLst>
+            <pc:docMk/>
+            <pc:sldMk cId="2080373582" sldId="264"/>
+            <ac:spMk id="2" creationId="{62044C42-26D3-9EE4-0E31-C9F9749B2E2C}"/>
+          </ac:spMkLst>
+        </pc:spChg>
+        <pc:spChg chg="add del mod">
+          <ac:chgData name="Garv ." userId="517ebc9b-5a76-4003-9b3c-a98d08664bbd" providerId="ADAL" clId="{F659861F-A15D-5394-9866-47331A7A7B4B}" dt="2025-12-19T22:04:43.873" v="1072" actId="20577"/>
+          <ac:spMkLst>
+            <pc:docMk/>
+            <pc:sldMk cId="2080373582" sldId="264"/>
+            <ac:spMk id="3" creationId="{5AD7D877-273A-2C32-A25E-309BF2DD96F3}"/>
+          </ac:spMkLst>
+        </pc:spChg>
+        <pc:spChg chg="add mod">
+          <ac:chgData name="Garv ." userId="517ebc9b-5a76-4003-9b3c-a98d08664bbd" providerId="ADAL" clId="{F659861F-A15D-5394-9866-47331A7A7B4B}" dt="2025-12-19T22:04:28.544" v="1036" actId="767"/>
+          <ac:spMkLst>
+            <pc:docMk/>
+            <pc:sldMk cId="2080373582" sldId="264"/>
+            <ac:spMk id="6" creationId="{A6B74219-8F43-0C6D-A8D5-DDE68951EA2B}"/>
+          </ac:spMkLst>
+        </pc:spChg>
+        <pc:picChg chg="add mod">
+          <ac:chgData name="Garv ." userId="517ebc9b-5a76-4003-9b3c-a98d08664bbd" providerId="ADAL" clId="{F659861F-A15D-5394-9866-47331A7A7B4B}" dt="2025-12-19T22:04:30.234" v="1044" actId="931"/>
+          <ac:picMkLst>
+            <pc:docMk/>
+            <pc:sldMk cId="2080373582" sldId="264"/>
+            <ac:picMk id="5" creationId="{618F1A1A-ACD6-1737-63EE-99219D3BF37B}"/>
+          </ac:picMkLst>
+        </pc:picChg>
+      </pc:sldChg>
+    </pc:docChg>
+  </pc:docChgLst>
+</pc:chgInfo>
 </file>
 
 <file path=ppt/slideLayouts/slideLayout1.xml><?xml version="1.0" encoding="utf-8"?>
@@ -8670,7 +8802,7 @@
           <a:p>
             <a:r>
               <a:rPr lang="en-US" sz="1600" dirty="0"/>
-              <a:t>SQL: Queries, Aggregations, fraud analysis, and KPI calculations</a:t>
+              <a:t>SQL: Querying, Aggregations, fraud analysis, and KPI calculations</a:t>
             </a:r>
           </a:p>
           <a:p>
@@ -8741,7 +8873,10 @@
           <a:bodyPr/>
           <a:lstStyle/>
           <a:p>
-            <a:endParaRPr lang="en-US"/>
+            <a:r>
+              <a:rPr lang="en-US" dirty="0"/>
+              <a:t>Data Cleaning &amp; Preparation (Excel)</a:t>
+            </a:r>
           </a:p>
         </p:txBody>
       </p:sp>
@@ -8761,12 +8896,70 @@
             <p:ph idx="1"/>
           </p:nvPr>
         </p:nvSpPr>
-        <p:spPr/>
+        <p:spPr>
+          <a:xfrm>
+            <a:off x="2589212" y="1905000"/>
+            <a:ext cx="8915400" cy="3777622"/>
+          </a:xfrm>
+        </p:spPr>
         <p:txBody>
           <a:bodyPr/>
           <a:lstStyle/>
           <a:p>
-            <a:endParaRPr lang="en-US"/>
+            <a:pPr marL="0" indent="0">
+              <a:buNone/>
+            </a:pPr>
+            <a:r>
+              <a:rPr lang="en-US" dirty="0"/>
+              <a:t>Raw Transactional data often contains inconsistencies that can distort analysis. Significant effort was invested in preparing the dataset for reliable analytics.</a:t>
+            </a:r>
+          </a:p>
+          <a:p>
+            <a:pPr marL="0" indent="0">
+              <a:buNone/>
+            </a:pPr>
+            <a:r>
+              <a:rPr lang="en-US" b="1" dirty="0"/>
+              <a:t>Cleaning steps performed:</a:t>
+            </a:r>
+          </a:p>
+          <a:p>
+            <a:r>
+              <a:rPr lang="en-US" sz="1600" dirty="0"/>
+              <a:t>Standardized column formats and naming conventions</a:t>
+            </a:r>
+          </a:p>
+          <a:p>
+            <a:r>
+              <a:rPr lang="en-US" sz="1600" dirty="0"/>
+              <a:t>Handled missing and inconsistent values</a:t>
+            </a:r>
+          </a:p>
+          <a:p>
+            <a:r>
+              <a:rPr lang="en-US" sz="1600" dirty="0"/>
+              <a:t>Split and normalized columns for SQL compatibility</a:t>
+            </a:r>
+          </a:p>
+          <a:p>
+            <a:r>
+              <a:rPr lang="en-US" sz="1600" dirty="0"/>
+              <a:t>Optimized structure for Power BI modeling</a:t>
+            </a:r>
+          </a:p>
+          <a:p>
+            <a:pPr marL="0" indent="0">
+              <a:buNone/>
+            </a:pPr>
+            <a:r>
+              <a:rPr lang="en-US" b="1" dirty="0"/>
+              <a:t>Result: </a:t>
+            </a:r>
+            <a:r>
+              <a:rPr lang="en-US" dirty="0"/>
+              <a:t>A clean, analysis-read dataset suitable for scalable querying and visualizations.</a:t>
+            </a:r>
+            <a:endParaRPr lang="en-US" b="1" dirty="0"/>
           </a:p>
         </p:txBody>
       </p:sp>
@@ -8774,6 +8967,256 @@
     <p:extLst>
       <p:ext uri="{BB962C8B-B14F-4D97-AF65-F5344CB8AC3E}">
         <p14:creationId xmlns:p14="http://schemas.microsoft.com/office/powerpoint/2010/main" val="2362849659"/>
+      </p:ext>
+    </p:extLst>
+  </p:cSld>
+  <p:clrMapOvr>
+    <a:masterClrMapping/>
+  </p:clrMapOvr>
+</p:sld>
+</file>
+
+<file path=ppt/slides/slide8.xml><?xml version="1.0" encoding="utf-8"?>
+<p:sld xmlns:a="http://schemas.openxmlformats.org/drawingml/2006/main" xmlns:r="http://schemas.openxmlformats.org/officeDocument/2006/relationships" xmlns:p="http://schemas.openxmlformats.org/presentationml/2006/main">
+  <p:cSld>
+    <p:spTree>
+      <p:nvGrpSpPr>
+        <p:cNvPr id="1" name=""/>
+        <p:cNvGrpSpPr/>
+        <p:nvPr/>
+      </p:nvGrpSpPr>
+      <p:grpSpPr>
+        <a:xfrm>
+          <a:off x="0" y="0"/>
+          <a:ext cx="0" cy="0"/>
+          <a:chOff x="0" y="0"/>
+          <a:chExt cx="0" cy="0"/>
+        </a:xfrm>
+      </p:grpSpPr>
+      <p:sp>
+        <p:nvSpPr>
+          <p:cNvPr id="2" name="Title 1">
+            <a:extLst>
+              <a:ext uri="{FF2B5EF4-FFF2-40B4-BE49-F238E27FC236}">
+                <a16:creationId xmlns:a16="http://schemas.microsoft.com/office/drawing/2014/main" id="{5FFDC9E4-426C-E933-DC3E-7B1A4101A069}"/>
+              </a:ext>
+            </a:extLst>
+          </p:cNvPr>
+          <p:cNvSpPr>
+            <a:spLocks noGrp="1"/>
+          </p:cNvSpPr>
+          <p:nvPr>
+            <p:ph type="title"/>
+          </p:nvPr>
+        </p:nvSpPr>
+        <p:spPr/>
+        <p:txBody>
+          <a:bodyPr/>
+          <a:lstStyle/>
+          <a:p>
+            <a:r>
+              <a:rPr lang="en-US" dirty="0"/>
+              <a:t>SQL Analysis Layer</a:t>
+            </a:r>
+          </a:p>
+        </p:txBody>
+      </p:sp>
+      <p:sp>
+        <p:nvSpPr>
+          <p:cNvPr id="3" name="Content Placeholder 2">
+            <a:extLst>
+              <a:ext uri="{FF2B5EF4-FFF2-40B4-BE49-F238E27FC236}">
+                <a16:creationId xmlns:a16="http://schemas.microsoft.com/office/drawing/2014/main" id="{DC8C6A0F-AD84-A6BA-D0FC-41428439EEF3}"/>
+              </a:ext>
+            </a:extLst>
+          </p:cNvPr>
+          <p:cNvSpPr>
+            <a:spLocks noGrp="1"/>
+          </p:cNvSpPr>
+          <p:nvPr>
+            <p:ph idx="1"/>
+          </p:nvPr>
+        </p:nvSpPr>
+        <p:spPr>
+          <a:xfrm>
+            <a:off x="2589212" y="1905000"/>
+            <a:ext cx="8915400" cy="3777622"/>
+          </a:xfrm>
+        </p:spPr>
+        <p:txBody>
+          <a:bodyPr>
+            <a:normAutofit fontScale="85000" lnSpcReduction="20000"/>
+          </a:bodyPr>
+          <a:lstStyle/>
+          <a:p>
+            <a:pPr marL="0" indent="0">
+              <a:buNone/>
+            </a:pPr>
+            <a:r>
+              <a:rPr lang="en-US" dirty="0"/>
+              <a:t>SQL acted as the analytical engine of this project, transforming cleaned transactional data into structured insights before visualization. Rather than pushing raw data directly into Power BI, SQL was used to validate trends, calculate risk metrics, and isolate fraud behavior, ensuring analytical accuracy and scalability.</a:t>
+            </a:r>
+          </a:p>
+          <a:p>
+            <a:pPr marL="0" indent="0">
+              <a:buNone/>
+            </a:pPr>
+            <a:r>
+              <a:rPr lang="en-US" dirty="0"/>
+              <a:t>Through SQL, this project replicated how banks typically analyze transaction data at the backend level before exposing results to dashboards.</a:t>
+            </a:r>
+          </a:p>
+          <a:p>
+            <a:pPr marL="0" indent="0">
+              <a:buNone/>
+            </a:pPr>
+            <a:r>
+              <a:rPr lang="en-US" b="1" dirty="0"/>
+              <a:t>Key SQL analysis performed.</a:t>
+            </a:r>
+          </a:p>
+          <a:p>
+            <a:r>
+              <a:rPr lang="en-US" sz="1600" dirty="0"/>
+              <a:t>Aggregation Transaction volume and Total monetary flow</a:t>
+            </a:r>
+          </a:p>
+          <a:p>
+            <a:r>
+              <a:rPr lang="en-US" sz="1600" dirty="0"/>
+              <a:t>Calculated Fraud rate and avg risk score</a:t>
+            </a:r>
+          </a:p>
+          <a:p>
+            <a:r>
+              <a:rPr lang="en-US" sz="1600" dirty="0"/>
+              <a:t>Identified high-risk Merchant category and </a:t>
+            </a:r>
+            <a:r>
+              <a:rPr lang="en-US" sz="1600"/>
+              <a:t>Transaction type</a:t>
+            </a:r>
+            <a:endParaRPr lang="en-US" sz="1600" dirty="0"/>
+          </a:p>
+          <a:p>
+            <a:r>
+              <a:rPr lang="en-US" sz="1600" dirty="0"/>
+              <a:t>Time-series trend extraction</a:t>
+            </a:r>
+          </a:p>
+          <a:p>
+            <a:pPr marL="0" indent="0">
+              <a:buNone/>
+            </a:pPr>
+            <a:r>
+              <a:rPr lang="en-US" dirty="0"/>
+              <a:t>This layer ensure accurate KPIs and reusable logic before visualization.</a:t>
+            </a:r>
+          </a:p>
+          <a:p>
+            <a:pPr marL="0" indent="0">
+              <a:buNone/>
+            </a:pPr>
+            <a:endParaRPr lang="en-US" dirty="0"/>
+          </a:p>
+          <a:p>
+            <a:pPr marL="0" indent="0">
+              <a:buNone/>
+            </a:pPr>
+            <a:r>
+              <a:rPr lang="en-US" dirty="0"/>
+              <a:t>DO THIS SLIDE AGAIN</a:t>
+            </a:r>
+          </a:p>
+        </p:txBody>
+      </p:sp>
+    </p:spTree>
+    <p:extLst>
+      <p:ext uri="{BB962C8B-B14F-4D97-AF65-F5344CB8AC3E}">
+        <p14:creationId xmlns:p14="http://schemas.microsoft.com/office/powerpoint/2010/main" val="1674953985"/>
+      </p:ext>
+    </p:extLst>
+  </p:cSld>
+  <p:clrMapOvr>
+    <a:masterClrMapping/>
+  </p:clrMapOvr>
+</p:sld>
+</file>
+
+<file path=ppt/slides/slide9.xml><?xml version="1.0" encoding="utf-8"?>
+<p:sld xmlns:a="http://schemas.openxmlformats.org/drawingml/2006/main" xmlns:r="http://schemas.openxmlformats.org/officeDocument/2006/relationships" xmlns:p="http://schemas.openxmlformats.org/presentationml/2006/main">
+  <p:cSld>
+    <p:spTree>
+      <p:nvGrpSpPr>
+        <p:cNvPr id="1" name=""/>
+        <p:cNvGrpSpPr/>
+        <p:nvPr/>
+      </p:nvGrpSpPr>
+      <p:grpSpPr>
+        <a:xfrm>
+          <a:off x="0" y="0"/>
+          <a:ext cx="0" cy="0"/>
+          <a:chOff x="0" y="0"/>
+          <a:chExt cx="0" cy="0"/>
+        </a:xfrm>
+      </p:grpSpPr>
+      <p:sp>
+        <p:nvSpPr>
+          <p:cNvPr id="2" name="Title 1">
+            <a:extLst>
+              <a:ext uri="{FF2B5EF4-FFF2-40B4-BE49-F238E27FC236}">
+                <a16:creationId xmlns:a16="http://schemas.microsoft.com/office/drawing/2014/main" id="{62044C42-26D3-9EE4-0E31-C9F9749B2E2C}"/>
+              </a:ext>
+            </a:extLst>
+          </p:cNvPr>
+          <p:cNvSpPr>
+            <a:spLocks noGrp="1"/>
+          </p:cNvSpPr>
+          <p:nvPr>
+            <p:ph type="title"/>
+          </p:nvPr>
+        </p:nvSpPr>
+        <p:spPr/>
+        <p:txBody>
+          <a:bodyPr/>
+          <a:lstStyle/>
+          <a:p>
+            <a:r>
+              <a:rPr lang="en-US" dirty="0"/>
+              <a:t>Key Performance Indicators (KPIs)</a:t>
+            </a:r>
+          </a:p>
+        </p:txBody>
+      </p:sp>
+      <p:sp>
+        <p:nvSpPr>
+          <p:cNvPr id="3" name="Content Placeholder 2">
+            <a:extLst>
+              <a:ext uri="{FF2B5EF4-FFF2-40B4-BE49-F238E27FC236}">
+                <a16:creationId xmlns:a16="http://schemas.microsoft.com/office/drawing/2014/main" id="{5AD7D877-273A-2C32-A25E-309BF2DD96F3}"/>
+              </a:ext>
+            </a:extLst>
+          </p:cNvPr>
+          <p:cNvSpPr>
+            <a:spLocks noGrp="1"/>
+          </p:cNvSpPr>
+          <p:nvPr>
+            <p:ph idx="1"/>
+          </p:nvPr>
+        </p:nvSpPr>
+        <p:spPr/>
+        <p:txBody>
+          <a:bodyPr/>
+          <a:lstStyle/>
+          <a:p>
+            <a:endParaRPr lang="en-US" dirty="0"/>
+          </a:p>
+        </p:txBody>
+      </p:sp>
+    </p:spTree>
+    <p:extLst>
+      <p:ext uri="{BB962C8B-B14F-4D97-AF65-F5344CB8AC3E}">
+        <p14:creationId xmlns:p14="http://schemas.microsoft.com/office/powerpoint/2010/main" val="2080373582"/>
       </p:ext>
     </p:extLst>
   </p:cSld>

</xml_diff>